<commit_message>
Brute force fix row splitting in heatmaps
</commit_message>
<xml_diff>
--- a/linsley_postdoc/presentations/weekly_meetings/1_11_24.pptx
+++ b/linsley_postdoc/presentations/weekly_meetings/1_11_24.pptx
@@ -7959,7 +7959,15 @@
             </a:r>
             <a:r>
               <a:rPr lang="en-US" sz="2600" dirty="0"/>
-              <a:t> groups in highly expanded CD8 TEMs pops out in summary heatmaps (highlighted rows), also see TRB CDR3 length difference in highly expanded CD8 TEMs (right heatmap)</a:t>
+              <a:t> groups in highly expanded CD8 TEMs apparent in both heatmaps; TRB CDR3 length difference in highly expanded CD8 TEMs in </a:t>
+            </a:r>
+            <a:r>
+              <a:rPr lang="en-US" sz="2600" dirty="0" err="1"/>
+              <a:t>downsampled</a:t>
+            </a:r>
+            <a:r>
+              <a:rPr lang="en-US" sz="2600" dirty="0"/>
+              <a:t> heatmap</a:t>
             </a:r>
           </a:p>
         </p:txBody>
@@ -8105,12 +8113,47 @@
           </a:p>
         </p:txBody>
       </p:sp>
+      <p:sp>
+        <p:nvSpPr>
+          <p:cNvPr id="14" name="TextBox 13">
+            <a:extLst>
+              <a:ext uri="{FF2B5EF4-FFF2-40B4-BE49-F238E27FC236}">
+                <a16:creationId xmlns:a16="http://schemas.microsoft.com/office/drawing/2014/main" id="{F528919C-E6E5-150C-6917-5E0AB2904EA6}"/>
+              </a:ext>
+            </a:extLst>
+          </p:cNvPr>
+          <p:cNvSpPr txBox="1"/>
+          <p:nvPr/>
+        </p:nvSpPr>
+        <p:spPr>
+          <a:xfrm>
+            <a:off x="2817987" y="6475872"/>
+            <a:ext cx="6556026" cy="369332"/>
+          </a:xfrm>
+          <a:prstGeom prst="rect">
+            <a:avLst/>
+          </a:prstGeom>
+          <a:noFill/>
+        </p:spPr>
+        <p:txBody>
+          <a:bodyPr wrap="none" rtlCol="0">
+            <a:spAutoFit/>
+          </a:bodyPr>
+          <a:lstStyle/>
+          <a:p>
+            <a:r>
+              <a:rPr lang="en-US" dirty="0"/>
+              <a:t>Filtered for rows with &gt; 1 p &lt; 0.05 tile, * denotes CD8 TEM TRB rows</a:t>
+            </a:r>
+          </a:p>
+        </p:txBody>
+      </p:sp>
       <p:pic>
         <p:nvPicPr>
-          <p:cNvPr id="8" name="Picture 7">
-            <a:extLst>
-              <a:ext uri="{FF2B5EF4-FFF2-40B4-BE49-F238E27FC236}">
-                <a16:creationId xmlns:a16="http://schemas.microsoft.com/office/drawing/2014/main" id="{43315652-A355-246B-A358-8C6D939FB7AF}"/>
+          <p:cNvPr id="3" name="Picture 2">
+            <a:extLst>
+              <a:ext uri="{FF2B5EF4-FFF2-40B4-BE49-F238E27FC236}">
+                <a16:creationId xmlns:a16="http://schemas.microsoft.com/office/drawing/2014/main" id="{A5191730-ED95-5F21-3DBB-107A9FADD77D}"/>
               </a:ext>
             </a:extLst>
           </p:cNvPr>
@@ -8127,8 +8170,8 @@
         </p:blipFill>
         <p:spPr>
           <a:xfrm>
-            <a:off x="6231835" y="2347301"/>
-            <a:ext cx="5960165" cy="3595667"/>
+            <a:off x="2104" y="2439190"/>
+            <a:ext cx="5809416" cy="3500133"/>
           </a:xfrm>
           <a:prstGeom prst="rect">
             <a:avLst/>
@@ -8137,10 +8180,10 @@
       </p:pic>
       <p:pic>
         <p:nvPicPr>
-          <p:cNvPr id="13" name="Picture 12">
-            <a:extLst>
-              <a:ext uri="{FF2B5EF4-FFF2-40B4-BE49-F238E27FC236}">
-                <a16:creationId xmlns:a16="http://schemas.microsoft.com/office/drawing/2014/main" id="{62B154AD-CA34-F34C-0A06-A6B4B76EB1B4}"/>
+          <p:cNvPr id="4" name="Picture 3">
+            <a:extLst>
+              <a:ext uri="{FF2B5EF4-FFF2-40B4-BE49-F238E27FC236}">
+                <a16:creationId xmlns:a16="http://schemas.microsoft.com/office/drawing/2014/main" id="{B37C6AB9-6BEB-1BC4-5849-79C74CCBA2ED}"/>
               </a:ext>
             </a:extLst>
           </p:cNvPr>
@@ -8157,49 +8200,14 @@
         </p:blipFill>
         <p:spPr>
           <a:xfrm>
-            <a:off x="0" y="2347301"/>
-            <a:ext cx="6115918" cy="3595667"/>
+            <a:off x="6096000" y="2466732"/>
+            <a:ext cx="5809416" cy="3474492"/>
           </a:xfrm>
           <a:prstGeom prst="rect">
             <a:avLst/>
           </a:prstGeom>
         </p:spPr>
       </p:pic>
-      <p:sp>
-        <p:nvSpPr>
-          <p:cNvPr id="14" name="TextBox 13">
-            <a:extLst>
-              <a:ext uri="{FF2B5EF4-FFF2-40B4-BE49-F238E27FC236}">
-                <a16:creationId xmlns:a16="http://schemas.microsoft.com/office/drawing/2014/main" id="{F528919C-E6E5-150C-6917-5E0AB2904EA6}"/>
-              </a:ext>
-            </a:extLst>
-          </p:cNvPr>
-          <p:cNvSpPr txBox="1"/>
-          <p:nvPr/>
-        </p:nvSpPr>
-        <p:spPr>
-          <a:xfrm>
-            <a:off x="3847664" y="6488668"/>
-            <a:ext cx="3687804" cy="369332"/>
-          </a:xfrm>
-          <a:prstGeom prst="rect">
-            <a:avLst/>
-          </a:prstGeom>
-          <a:noFill/>
-        </p:spPr>
-        <p:txBody>
-          <a:bodyPr wrap="none" rtlCol="0">
-            <a:spAutoFit/>
-          </a:bodyPr>
-          <a:lstStyle/>
-          <a:p>
-            <a:r>
-              <a:rPr lang="en-US" dirty="0"/>
-              <a:t>Filtered for rows with &gt; 1 p &lt; 0.05 tile</a:t>
-            </a:r>
-          </a:p>
-        </p:txBody>
-      </p:sp>
     </p:spTree>
     <p:extLst>
       <p:ext uri="{BB962C8B-B14F-4D97-AF65-F5344CB8AC3E}">
@@ -8259,8 +8267,12 @@
           <a:lstStyle/>
           <a:p>
             <a:r>
+              <a:rPr lang="en-US" sz="3200" dirty="0" err="1"/>
+              <a:t>Coliits</a:t>
+            </a:r>
+            <a:r>
               <a:rPr lang="en-US" sz="3200" dirty="0"/>
-              <a:t>Colitis dataset: in left (normalized) heatmap, see CD8 TEM </a:t>
+              <a:t> dataset: TRB </a:t>
             </a:r>
             <a:r>
               <a:rPr lang="en-US" sz="3200" dirty="0" err="1"/>
@@ -8268,7 +8280,15 @@
             </a:r>
             <a:r>
               <a:rPr lang="en-US" sz="3200" dirty="0"/>
-              <a:t> TRB difference at 40% cutoff and CD8 TEM TRB CDR3 length difference at 20-40% cutoffs (highlighted rows)</a:t>
+              <a:t> and CDR3 length differences between </a:t>
+            </a:r>
+            <a:r>
+              <a:rPr lang="en-US" sz="3200" dirty="0" err="1"/>
+              <a:t>irAE</a:t>
+            </a:r>
+            <a:r>
+              <a:rPr lang="en-US" sz="3200" dirty="0"/>
+              <a:t> groups in highly expanded CD8 TEMs apparent in in left heatmap</a:t>
             </a:r>
           </a:p>
         </p:txBody>
@@ -8414,47 +8434,12 @@
           </a:p>
         </p:txBody>
       </p:sp>
-      <p:sp>
-        <p:nvSpPr>
-          <p:cNvPr id="3" name="TextBox 2">
-            <a:extLst>
-              <a:ext uri="{FF2B5EF4-FFF2-40B4-BE49-F238E27FC236}">
-                <a16:creationId xmlns:a16="http://schemas.microsoft.com/office/drawing/2014/main" id="{2A6D0141-EDEC-E09F-97F1-2BB4B9F4276A}"/>
-              </a:ext>
-            </a:extLst>
-          </p:cNvPr>
-          <p:cNvSpPr txBox="1"/>
-          <p:nvPr/>
-        </p:nvSpPr>
-        <p:spPr>
-          <a:xfrm>
-            <a:off x="3847664" y="6488668"/>
-            <a:ext cx="3687804" cy="369332"/>
-          </a:xfrm>
-          <a:prstGeom prst="rect">
-            <a:avLst/>
-          </a:prstGeom>
-          <a:noFill/>
-        </p:spPr>
-        <p:txBody>
-          <a:bodyPr wrap="none" rtlCol="0">
-            <a:spAutoFit/>
-          </a:bodyPr>
-          <a:lstStyle/>
-          <a:p>
-            <a:r>
-              <a:rPr lang="en-US" dirty="0"/>
-              <a:t>Filtered for rows with &gt; 1 p &lt; 0.05 tile</a:t>
-            </a:r>
-          </a:p>
-        </p:txBody>
-      </p:sp>
       <p:pic>
         <p:nvPicPr>
-          <p:cNvPr id="4" name="Picture 3">
-            <a:extLst>
-              <a:ext uri="{FF2B5EF4-FFF2-40B4-BE49-F238E27FC236}">
-                <a16:creationId xmlns:a16="http://schemas.microsoft.com/office/drawing/2014/main" id="{2273E317-0383-37AB-AC3C-86CE63E0EA0F}"/>
+          <p:cNvPr id="8" name="Picture 7">
+            <a:extLst>
+              <a:ext uri="{FF2B5EF4-FFF2-40B4-BE49-F238E27FC236}">
+                <a16:creationId xmlns:a16="http://schemas.microsoft.com/office/drawing/2014/main" id="{316BDDFF-1B53-4740-B879-3F2A006188A7}"/>
               </a:ext>
             </a:extLst>
           </p:cNvPr>
@@ -8471,8 +8456,8 @@
         </p:blipFill>
         <p:spPr>
           <a:xfrm>
-            <a:off x="0" y="2652056"/>
-            <a:ext cx="5877589" cy="3554270"/>
+            <a:off x="6136816" y="2633492"/>
+            <a:ext cx="5877589" cy="3591398"/>
           </a:xfrm>
           <a:prstGeom prst="rect">
             <a:avLst/>
@@ -8481,10 +8466,10 @@
       </p:pic>
       <p:pic>
         <p:nvPicPr>
-          <p:cNvPr id="8" name="Picture 7">
-            <a:extLst>
-              <a:ext uri="{FF2B5EF4-FFF2-40B4-BE49-F238E27FC236}">
-                <a16:creationId xmlns:a16="http://schemas.microsoft.com/office/drawing/2014/main" id="{316BDDFF-1B53-4740-B879-3F2A006188A7}"/>
+          <p:cNvPr id="12" name="Picture 11">
+            <a:extLst>
+              <a:ext uri="{FF2B5EF4-FFF2-40B4-BE49-F238E27FC236}">
+                <a16:creationId xmlns:a16="http://schemas.microsoft.com/office/drawing/2014/main" id="{D9971EE1-01C4-68E8-783D-91C24E840BE1}"/>
               </a:ext>
             </a:extLst>
           </p:cNvPr>
@@ -8501,14 +8486,49 @@
         </p:blipFill>
         <p:spPr>
           <a:xfrm>
-            <a:off x="6136816" y="2633492"/>
-            <a:ext cx="5877589" cy="3591398"/>
+            <a:off x="0" y="2628986"/>
+            <a:ext cx="5750560" cy="3504496"/>
           </a:xfrm>
           <a:prstGeom prst="rect">
             <a:avLst/>
           </a:prstGeom>
         </p:spPr>
       </p:pic>
+      <p:sp>
+        <p:nvSpPr>
+          <p:cNvPr id="15" name="TextBox 14">
+            <a:extLst>
+              <a:ext uri="{FF2B5EF4-FFF2-40B4-BE49-F238E27FC236}">
+                <a16:creationId xmlns:a16="http://schemas.microsoft.com/office/drawing/2014/main" id="{7C4D998F-1F34-E355-7DA5-F7140F2A9CC3}"/>
+              </a:ext>
+            </a:extLst>
+          </p:cNvPr>
+          <p:cNvSpPr txBox="1"/>
+          <p:nvPr/>
+        </p:nvSpPr>
+        <p:spPr>
+          <a:xfrm>
+            <a:off x="2817987" y="6475872"/>
+            <a:ext cx="6556026" cy="369332"/>
+          </a:xfrm>
+          <a:prstGeom prst="rect">
+            <a:avLst/>
+          </a:prstGeom>
+          <a:noFill/>
+        </p:spPr>
+        <p:txBody>
+          <a:bodyPr wrap="none" rtlCol="0">
+            <a:spAutoFit/>
+          </a:bodyPr>
+          <a:lstStyle/>
+          <a:p>
+            <a:r>
+              <a:rPr lang="en-US" dirty="0"/>
+              <a:t>Filtered for rows with &gt; 1 p &lt; 0.05 tile, * denotes CD8 TEM TRB rows</a:t>
+            </a:r>
+          </a:p>
+        </p:txBody>
+      </p:sp>
     </p:spTree>
     <p:extLst>
       <p:ext uri="{BB962C8B-B14F-4D97-AF65-F5344CB8AC3E}">

</xml_diff>